<commit_message>
Formatting edits for clinical validity chapter
</commit_message>
<xml_diff>
--- a/extras/FiguresClinicalValidity.pptx
+++ b/extras/FiguresClinicalValidity.pptx
@@ -6,6 +6,7 @@
   </p:sldMasterIdLst>
   <p:sldIdLst>
     <p:sldId id="266" r:id="rId2"/>
+    <p:sldId id="267" r:id="rId3"/>
   </p:sldIdLst>
   <p:sldSz cx="12192000" cy="6858000"/>
   <p:notesSz cx="6858000" cy="9144000"/>
@@ -259,7 +260,7 @@
           <a:p>
             <a:fld id="{05EFC541-71C0-43FA-B841-C6A9FD087892}" type="datetimeFigureOut">
               <a:rPr lang="en-US" smtClean="0"/>
-              <a:t>8/9/2019</a:t>
+              <a:t>8/25/2019</a:t>
             </a:fld>
             <a:endParaRPr lang="en-US"/>
           </a:p>
@@ -457,7 +458,7 @@
           <a:p>
             <a:fld id="{05EFC541-71C0-43FA-B841-C6A9FD087892}" type="datetimeFigureOut">
               <a:rPr lang="en-US" smtClean="0"/>
-              <a:t>8/9/2019</a:t>
+              <a:t>8/25/2019</a:t>
             </a:fld>
             <a:endParaRPr lang="en-US"/>
           </a:p>
@@ -665,7 +666,7 @@
           <a:p>
             <a:fld id="{05EFC541-71C0-43FA-B841-C6A9FD087892}" type="datetimeFigureOut">
               <a:rPr lang="en-US" smtClean="0"/>
-              <a:t>8/9/2019</a:t>
+              <a:t>8/25/2019</a:t>
             </a:fld>
             <a:endParaRPr lang="en-US"/>
           </a:p>
@@ -863,7 +864,7 @@
           <a:p>
             <a:fld id="{05EFC541-71C0-43FA-B841-C6A9FD087892}" type="datetimeFigureOut">
               <a:rPr lang="en-US" smtClean="0"/>
-              <a:t>8/9/2019</a:t>
+              <a:t>8/25/2019</a:t>
             </a:fld>
             <a:endParaRPr lang="en-US"/>
           </a:p>
@@ -1138,7 +1139,7 @@
           <a:p>
             <a:fld id="{05EFC541-71C0-43FA-B841-C6A9FD087892}" type="datetimeFigureOut">
               <a:rPr lang="en-US" smtClean="0"/>
-              <a:t>8/9/2019</a:t>
+              <a:t>8/25/2019</a:t>
             </a:fld>
             <a:endParaRPr lang="en-US"/>
           </a:p>
@@ -1403,7 +1404,7 @@
           <a:p>
             <a:fld id="{05EFC541-71C0-43FA-B841-C6A9FD087892}" type="datetimeFigureOut">
               <a:rPr lang="en-US" smtClean="0"/>
-              <a:t>8/9/2019</a:t>
+              <a:t>8/25/2019</a:t>
             </a:fld>
             <a:endParaRPr lang="en-US"/>
           </a:p>
@@ -1815,7 +1816,7 @@
           <a:p>
             <a:fld id="{05EFC541-71C0-43FA-B841-C6A9FD087892}" type="datetimeFigureOut">
               <a:rPr lang="en-US" smtClean="0"/>
-              <a:t>8/9/2019</a:t>
+              <a:t>8/25/2019</a:t>
             </a:fld>
             <a:endParaRPr lang="en-US"/>
           </a:p>
@@ -1956,7 +1957,7 @@
           <a:p>
             <a:fld id="{05EFC541-71C0-43FA-B841-C6A9FD087892}" type="datetimeFigureOut">
               <a:rPr lang="en-US" smtClean="0"/>
-              <a:t>8/9/2019</a:t>
+              <a:t>8/25/2019</a:t>
             </a:fld>
             <a:endParaRPr lang="en-US"/>
           </a:p>
@@ -2069,7 +2070,7 @@
           <a:p>
             <a:fld id="{05EFC541-71C0-43FA-B841-C6A9FD087892}" type="datetimeFigureOut">
               <a:rPr lang="en-US" smtClean="0"/>
-              <a:t>8/9/2019</a:t>
+              <a:t>8/25/2019</a:t>
             </a:fld>
             <a:endParaRPr lang="en-US"/>
           </a:p>
@@ -2380,7 +2381,7 @@
           <a:p>
             <a:fld id="{05EFC541-71C0-43FA-B841-C6A9FD087892}" type="datetimeFigureOut">
               <a:rPr lang="en-US" smtClean="0"/>
-              <a:t>8/9/2019</a:t>
+              <a:t>8/25/2019</a:t>
             </a:fld>
             <a:endParaRPr lang="en-US"/>
           </a:p>
@@ -2668,7 +2669,7 @@
           <a:p>
             <a:fld id="{05EFC541-71C0-43FA-B841-C6A9FD087892}" type="datetimeFigureOut">
               <a:rPr lang="en-US" smtClean="0"/>
-              <a:t>8/9/2019</a:t>
+              <a:t>8/25/2019</a:t>
             </a:fld>
             <a:endParaRPr lang="en-US"/>
           </a:p>
@@ -2909,7 +2910,7 @@
           <a:p>
             <a:fld id="{05EFC541-71C0-43FA-B841-C6A9FD087892}" type="datetimeFigureOut">
               <a:rPr lang="en-US" smtClean="0"/>
-              <a:t>8/9/2019</a:t>
+              <a:t>8/25/2019</a:t>
             </a:fld>
             <a:endParaRPr lang="en-US"/>
           </a:p>
@@ -4434,6 +4435,515 @@
 </p:sld>
 </file>
 
+<file path=ppt/slides/slide2.xml><?xml version="1.0" encoding="utf-8"?>
+<p:sld xmlns:a="http://schemas.openxmlformats.org/drawingml/2006/main" xmlns:r="http://schemas.openxmlformats.org/officeDocument/2006/relationships" xmlns:p="http://schemas.openxmlformats.org/presentationml/2006/main">
+  <p:cSld>
+    <p:spTree>
+      <p:nvGrpSpPr>
+        <p:cNvPr id="1" name=""/>
+        <p:cNvGrpSpPr/>
+        <p:nvPr/>
+      </p:nvGrpSpPr>
+      <p:grpSpPr>
+        <a:xfrm>
+          <a:off x="0" y="0"/>
+          <a:ext cx="0" cy="0"/>
+          <a:chOff x="0" y="0"/>
+          <a:chExt cx="0" cy="0"/>
+        </a:xfrm>
+      </p:grpSpPr>
+      <p:graphicFrame>
+        <p:nvGraphicFramePr>
+          <p:cNvPr id="2" name="Table 1">
+            <a:extLst>
+              <a:ext uri="{FF2B5EF4-FFF2-40B4-BE49-F238E27FC236}">
+                <a16:creationId xmlns:a16="http://schemas.microsoft.com/office/drawing/2014/main" id="{284856D5-18B0-4890-8AD4-E65D7096E054}"/>
+              </a:ext>
+            </a:extLst>
+          </p:cNvPr>
+          <p:cNvGraphicFramePr>
+            <a:graphicFrameLocks noGrp="1"/>
+          </p:cNvGraphicFramePr>
+          <p:nvPr>
+            <p:extLst>
+              <p:ext uri="{D42A27DB-BD31-4B8C-83A1-F6EECF244321}">
+                <p14:modId xmlns:p14="http://schemas.microsoft.com/office/powerpoint/2010/main" val="3244282966"/>
+              </p:ext>
+            </p:extLst>
+          </p:nvPr>
+        </p:nvGraphicFramePr>
+        <p:xfrm>
+          <a:off x="0" y="0"/>
+          <a:ext cx="6641275" cy="1483360"/>
+        </p:xfrm>
+        <a:graphic>
+          <a:graphicData uri="http://schemas.openxmlformats.org/drawingml/2006/table">
+            <a:tbl>
+              <a:tblPr firstRow="1" bandRow="1">
+                <a:tableStyleId>{2D5ABB26-0587-4C30-8999-92F81FD0307C}</a:tableStyleId>
+              </a:tblPr>
+              <a:tblGrid>
+                <a:gridCol w="1878267">
+                  <a:extLst>
+                    <a:ext uri="{9D8B030D-6E8A-4147-A177-3AD203B41FA5}">
+                      <a16:colId xmlns:a16="http://schemas.microsoft.com/office/drawing/2014/main" val="2679336836"/>
+                    </a:ext>
+                  </a:extLst>
+                </a:gridCol>
+                <a:gridCol w="699008">
+                  <a:extLst>
+                    <a:ext uri="{9D8B030D-6E8A-4147-A177-3AD203B41FA5}">
+                      <a16:colId xmlns:a16="http://schemas.microsoft.com/office/drawing/2014/main" val="395205913"/>
+                    </a:ext>
+                  </a:extLst>
+                </a:gridCol>
+                <a:gridCol w="2032000">
+                  <a:extLst>
+                    <a:ext uri="{9D8B030D-6E8A-4147-A177-3AD203B41FA5}">
+                      <a16:colId xmlns:a16="http://schemas.microsoft.com/office/drawing/2014/main" val="1123304677"/>
+                    </a:ext>
+                  </a:extLst>
+                </a:gridCol>
+                <a:gridCol w="2032000">
+                  <a:extLst>
+                    <a:ext uri="{9D8B030D-6E8A-4147-A177-3AD203B41FA5}">
+                      <a16:colId xmlns:a16="http://schemas.microsoft.com/office/drawing/2014/main" val="58570244"/>
+                    </a:ext>
+                  </a:extLst>
+                </a:gridCol>
+              </a:tblGrid>
+              <a:tr h="370840">
+                <a:tc>
+                  <a:txBody>
+                    <a:bodyPr/>
+                    <a:lstStyle/>
+                    <a:p>
+                      <a:endParaRPr lang="en-US" dirty="0"/>
+                    </a:p>
+                  </a:txBody>
+                  <a:tcPr/>
+                </a:tc>
+                <a:tc>
+                  <a:txBody>
+                    <a:bodyPr/>
+                    <a:lstStyle/>
+                    <a:p>
+                      <a:endParaRPr lang="en-US" dirty="0"/>
+                    </a:p>
+                  </a:txBody>
+                  <a:tcPr/>
+                </a:tc>
+                <a:tc gridSpan="2">
+                  <a:txBody>
+                    <a:bodyPr/>
+                    <a:lstStyle/>
+                    <a:p>
+                      <a:pPr algn="ctr"/>
+                      <a:r>
+                        <a:rPr lang="en-US" b="1" dirty="0"/>
+                        <a:t>Gold Standard</a:t>
+                      </a:r>
+                    </a:p>
+                  </a:txBody>
+                  <a:tcPr/>
+                </a:tc>
+                <a:tc hMerge="1">
+                  <a:txBody>
+                    <a:bodyPr/>
+                    <a:lstStyle/>
+                    <a:p>
+                      <a:endParaRPr lang="en-US" dirty="0"/>
+                    </a:p>
+                  </a:txBody>
+                  <a:tcPr/>
+                </a:tc>
+                <a:extLst>
+                  <a:ext uri="{0D108BD9-81ED-4DB2-BD59-A6C34878D82A}">
+                    <a16:rowId xmlns:a16="http://schemas.microsoft.com/office/drawing/2014/main" val="1485266883"/>
+                  </a:ext>
+                </a:extLst>
+              </a:tr>
+              <a:tr h="370840">
+                <a:tc>
+                  <a:txBody>
+                    <a:bodyPr/>
+                    <a:lstStyle/>
+                    <a:p>
+                      <a:endParaRPr lang="en-US" dirty="0"/>
+                    </a:p>
+                  </a:txBody>
+                  <a:tcPr/>
+                </a:tc>
+                <a:tc>
+                  <a:txBody>
+                    <a:bodyPr/>
+                    <a:lstStyle/>
+                    <a:p>
+                      <a:endParaRPr lang="en-US" dirty="0"/>
+                    </a:p>
+                  </a:txBody>
+                  <a:tcPr/>
+                </a:tc>
+                <a:tc>
+                  <a:txBody>
+                    <a:bodyPr/>
+                    <a:lstStyle/>
+                    <a:p>
+                      <a:pPr algn="ctr"/>
+                      <a:r>
+                        <a:rPr lang="en-US" dirty="0"/>
+                        <a:t>True</a:t>
+                      </a:r>
+                    </a:p>
+                  </a:txBody>
+                  <a:tcPr>
+                    <a:lnB w="12700" cap="flat" cmpd="sng" algn="ctr">
+                      <a:solidFill>
+                        <a:schemeClr val="tx1"/>
+                      </a:solidFill>
+                      <a:prstDash val="solid"/>
+                      <a:round/>
+                      <a:headEnd type="none" w="med" len="med"/>
+                      <a:tailEnd type="none" w="med" len="med"/>
+                    </a:lnB>
+                  </a:tcPr>
+                </a:tc>
+                <a:tc>
+                  <a:txBody>
+                    <a:bodyPr/>
+                    <a:lstStyle/>
+                    <a:p>
+                      <a:pPr algn="ctr"/>
+                      <a:r>
+                        <a:rPr lang="en-US" dirty="0"/>
+                        <a:t>False</a:t>
+                      </a:r>
+                    </a:p>
+                  </a:txBody>
+                  <a:tcPr>
+                    <a:lnB w="12700" cap="flat" cmpd="sng" algn="ctr">
+                      <a:solidFill>
+                        <a:schemeClr val="tx1"/>
+                      </a:solidFill>
+                      <a:prstDash val="solid"/>
+                      <a:round/>
+                      <a:headEnd type="none" w="med" len="med"/>
+                      <a:tailEnd type="none" w="med" len="med"/>
+                    </a:lnB>
+                  </a:tcPr>
+                </a:tc>
+                <a:extLst>
+                  <a:ext uri="{0D108BD9-81ED-4DB2-BD59-A6C34878D82A}">
+                    <a16:rowId xmlns:a16="http://schemas.microsoft.com/office/drawing/2014/main" val="1984788139"/>
+                  </a:ext>
+                </a:extLst>
+              </a:tr>
+              <a:tr h="370840">
+                <a:tc rowSpan="2">
+                  <a:txBody>
+                    <a:bodyPr/>
+                    <a:lstStyle/>
+                    <a:p>
+                      <a:r>
+                        <a:rPr lang="en-US" b="1" dirty="0"/>
+                        <a:t>Cohort Definition</a:t>
+                      </a:r>
+                    </a:p>
+                  </a:txBody>
+                  <a:tcPr anchor="ctr"/>
+                </a:tc>
+                <a:tc>
+                  <a:txBody>
+                    <a:bodyPr/>
+                    <a:lstStyle/>
+                    <a:p>
+                      <a:pPr algn="r"/>
+                      <a:r>
+                        <a:rPr lang="en-US" dirty="0"/>
+                        <a:t>True</a:t>
+                      </a:r>
+                    </a:p>
+                  </a:txBody>
+                  <a:tcPr>
+                    <a:lnR w="12700" cap="flat" cmpd="sng" algn="ctr">
+                      <a:solidFill>
+                        <a:schemeClr val="tx1"/>
+                      </a:solidFill>
+                      <a:prstDash val="solid"/>
+                      <a:round/>
+                      <a:headEnd type="none" w="med" len="med"/>
+                      <a:tailEnd type="none" w="med" len="med"/>
+                    </a:lnR>
+                  </a:tcPr>
+                </a:tc>
+                <a:tc>
+                  <a:txBody>
+                    <a:bodyPr/>
+                    <a:lstStyle/>
+                    <a:p>
+                      <a:pPr algn="ctr"/>
+                      <a:r>
+                        <a:rPr lang="en-US" dirty="0"/>
+                        <a:t>True Positive</a:t>
+                      </a:r>
+                    </a:p>
+                  </a:txBody>
+                  <a:tcPr>
+                    <a:lnL w="12700" cap="flat" cmpd="sng" algn="ctr">
+                      <a:solidFill>
+                        <a:schemeClr val="tx1"/>
+                      </a:solidFill>
+                      <a:prstDash val="solid"/>
+                      <a:round/>
+                      <a:headEnd type="none" w="med" len="med"/>
+                      <a:tailEnd type="none" w="med" len="med"/>
+                    </a:lnL>
+                    <a:lnR w="12700" cap="flat" cmpd="sng" algn="ctr">
+                      <a:solidFill>
+                        <a:schemeClr val="tx1"/>
+                      </a:solidFill>
+                      <a:prstDash val="solid"/>
+                      <a:round/>
+                      <a:headEnd type="none" w="med" len="med"/>
+                      <a:tailEnd type="none" w="med" len="med"/>
+                    </a:lnR>
+                    <a:lnT w="12700" cap="flat" cmpd="sng" algn="ctr">
+                      <a:solidFill>
+                        <a:schemeClr val="tx1"/>
+                      </a:solidFill>
+                      <a:prstDash val="solid"/>
+                      <a:round/>
+                      <a:headEnd type="none" w="med" len="med"/>
+                      <a:tailEnd type="none" w="med" len="med"/>
+                    </a:lnT>
+                    <a:lnB w="12700" cap="flat" cmpd="sng" algn="ctr">
+                      <a:solidFill>
+                        <a:schemeClr val="tx1"/>
+                      </a:solidFill>
+                      <a:prstDash val="solid"/>
+                      <a:round/>
+                      <a:headEnd type="none" w="med" len="med"/>
+                      <a:tailEnd type="none" w="med" len="med"/>
+                    </a:lnB>
+                  </a:tcPr>
+                </a:tc>
+                <a:tc>
+                  <a:txBody>
+                    <a:bodyPr/>
+                    <a:lstStyle/>
+                    <a:p>
+                      <a:pPr algn="ctr"/>
+                      <a:r>
+                        <a:rPr lang="en-US" dirty="0"/>
+                        <a:t>False Negative</a:t>
+                      </a:r>
+                    </a:p>
+                  </a:txBody>
+                  <a:tcPr>
+                    <a:lnL w="12700" cap="flat" cmpd="sng" algn="ctr">
+                      <a:solidFill>
+                        <a:schemeClr val="tx1"/>
+                      </a:solidFill>
+                      <a:prstDash val="solid"/>
+                      <a:round/>
+                      <a:headEnd type="none" w="med" len="med"/>
+                      <a:tailEnd type="none" w="med" len="med"/>
+                    </a:lnL>
+                    <a:lnR w="12700" cap="flat" cmpd="sng" algn="ctr">
+                      <a:solidFill>
+                        <a:schemeClr val="tx1"/>
+                      </a:solidFill>
+                      <a:prstDash val="solid"/>
+                      <a:round/>
+                      <a:headEnd type="none" w="med" len="med"/>
+                      <a:tailEnd type="none" w="med" len="med"/>
+                    </a:lnR>
+                    <a:lnT w="12700" cap="flat" cmpd="sng" algn="ctr">
+                      <a:solidFill>
+                        <a:schemeClr val="tx1"/>
+                      </a:solidFill>
+                      <a:prstDash val="solid"/>
+                      <a:round/>
+                      <a:headEnd type="none" w="med" len="med"/>
+                      <a:tailEnd type="none" w="med" len="med"/>
+                    </a:lnT>
+                    <a:lnB w="12700" cap="flat" cmpd="sng" algn="ctr">
+                      <a:solidFill>
+                        <a:schemeClr val="tx1"/>
+                      </a:solidFill>
+                      <a:prstDash val="solid"/>
+                      <a:round/>
+                      <a:headEnd type="none" w="med" len="med"/>
+                      <a:tailEnd type="none" w="med" len="med"/>
+                    </a:lnB>
+                  </a:tcPr>
+                </a:tc>
+                <a:extLst>
+                  <a:ext uri="{0D108BD9-81ED-4DB2-BD59-A6C34878D82A}">
+                    <a16:rowId xmlns:a16="http://schemas.microsoft.com/office/drawing/2014/main" val="419680756"/>
+                  </a:ext>
+                </a:extLst>
+              </a:tr>
+              <a:tr h="370840">
+                <a:tc vMerge="1">
+                  <a:txBody>
+                    <a:bodyPr/>
+                    <a:lstStyle/>
+                    <a:p>
+                      <a:endParaRPr lang="en-US" dirty="0"/>
+                    </a:p>
+                  </a:txBody>
+                  <a:tcPr/>
+                </a:tc>
+                <a:tc>
+                  <a:txBody>
+                    <a:bodyPr/>
+                    <a:lstStyle/>
+                    <a:p>
+                      <a:pPr algn="r"/>
+                      <a:r>
+                        <a:rPr lang="en-US" dirty="0"/>
+                        <a:t>False</a:t>
+                      </a:r>
+                    </a:p>
+                  </a:txBody>
+                  <a:tcPr>
+                    <a:lnR w="12700" cap="flat" cmpd="sng" algn="ctr">
+                      <a:solidFill>
+                        <a:schemeClr val="tx1"/>
+                      </a:solidFill>
+                      <a:prstDash val="solid"/>
+                      <a:round/>
+                      <a:headEnd type="none" w="med" len="med"/>
+                      <a:tailEnd type="none" w="med" len="med"/>
+                    </a:lnR>
+                  </a:tcPr>
+                </a:tc>
+                <a:tc>
+                  <a:txBody>
+                    <a:bodyPr/>
+                    <a:lstStyle/>
+                    <a:p>
+                      <a:pPr algn="ctr"/>
+                      <a:r>
+                        <a:rPr lang="en-US" dirty="0"/>
+                        <a:t>False Negative</a:t>
+                      </a:r>
+                    </a:p>
+                  </a:txBody>
+                  <a:tcPr>
+                    <a:lnL w="12700" cap="flat" cmpd="sng" algn="ctr">
+                      <a:solidFill>
+                        <a:schemeClr val="tx1"/>
+                      </a:solidFill>
+                      <a:prstDash val="solid"/>
+                      <a:round/>
+                      <a:headEnd type="none" w="med" len="med"/>
+                      <a:tailEnd type="none" w="med" len="med"/>
+                    </a:lnL>
+                    <a:lnR w="12700" cap="flat" cmpd="sng" algn="ctr">
+                      <a:solidFill>
+                        <a:schemeClr val="tx1"/>
+                      </a:solidFill>
+                      <a:prstDash val="solid"/>
+                      <a:round/>
+                      <a:headEnd type="none" w="med" len="med"/>
+                      <a:tailEnd type="none" w="med" len="med"/>
+                    </a:lnR>
+                    <a:lnT w="12700" cap="flat" cmpd="sng" algn="ctr">
+                      <a:solidFill>
+                        <a:schemeClr val="tx1"/>
+                      </a:solidFill>
+                      <a:prstDash val="solid"/>
+                      <a:round/>
+                      <a:headEnd type="none" w="med" len="med"/>
+                      <a:tailEnd type="none" w="med" len="med"/>
+                    </a:lnT>
+                    <a:lnB w="12700" cap="flat" cmpd="sng" algn="ctr">
+                      <a:solidFill>
+                        <a:schemeClr val="tx1"/>
+                      </a:solidFill>
+                      <a:prstDash val="solid"/>
+                      <a:round/>
+                      <a:headEnd type="none" w="med" len="med"/>
+                      <a:tailEnd type="none" w="med" len="med"/>
+                    </a:lnB>
+                  </a:tcPr>
+                </a:tc>
+                <a:tc>
+                  <a:txBody>
+                    <a:bodyPr/>
+                    <a:lstStyle/>
+                    <a:p>
+                      <a:pPr algn="ctr"/>
+                      <a:r>
+                        <a:rPr lang="en-US" dirty="0"/>
+                        <a:t>True Negative</a:t>
+                      </a:r>
+                    </a:p>
+                  </a:txBody>
+                  <a:tcPr>
+                    <a:lnL w="12700" cap="flat" cmpd="sng" algn="ctr">
+                      <a:solidFill>
+                        <a:schemeClr val="tx1"/>
+                      </a:solidFill>
+                      <a:prstDash val="solid"/>
+                      <a:round/>
+                      <a:headEnd type="none" w="med" len="med"/>
+                      <a:tailEnd type="none" w="med" len="med"/>
+                    </a:lnL>
+                    <a:lnR w="12700" cap="flat" cmpd="sng" algn="ctr">
+                      <a:solidFill>
+                        <a:schemeClr val="tx1"/>
+                      </a:solidFill>
+                      <a:prstDash val="solid"/>
+                      <a:round/>
+                      <a:headEnd type="none" w="med" len="med"/>
+                      <a:tailEnd type="none" w="med" len="med"/>
+                    </a:lnR>
+                    <a:lnT w="12700" cap="flat" cmpd="sng" algn="ctr">
+                      <a:solidFill>
+                        <a:schemeClr val="tx1"/>
+                      </a:solidFill>
+                      <a:prstDash val="solid"/>
+                      <a:round/>
+                      <a:headEnd type="none" w="med" len="med"/>
+                      <a:tailEnd type="none" w="med" len="med"/>
+                    </a:lnT>
+                    <a:lnB w="12700" cap="flat" cmpd="sng" algn="ctr">
+                      <a:solidFill>
+                        <a:schemeClr val="tx1"/>
+                      </a:solidFill>
+                      <a:prstDash val="solid"/>
+                      <a:round/>
+                      <a:headEnd type="none" w="med" len="med"/>
+                      <a:tailEnd type="none" w="med" len="med"/>
+                    </a:lnB>
+                  </a:tcPr>
+                </a:tc>
+                <a:extLst>
+                  <a:ext uri="{0D108BD9-81ED-4DB2-BD59-A6C34878D82A}">
+                    <a16:rowId xmlns:a16="http://schemas.microsoft.com/office/drawing/2014/main" val="2382529982"/>
+                  </a:ext>
+                </a:extLst>
+              </a:tr>
+            </a:tbl>
+          </a:graphicData>
+        </a:graphic>
+      </p:graphicFrame>
+    </p:spTree>
+    <p:extLst>
+      <p:ext uri="{BB962C8B-B14F-4D97-AF65-F5344CB8AC3E}">
+        <p14:creationId xmlns:p14="http://schemas.microsoft.com/office/powerpoint/2010/main" val="3097430595"/>
+      </p:ext>
+    </p:extLst>
+  </p:cSld>
+  <p:clrMapOvr>
+    <a:masterClrMapping/>
+  </p:clrMapOvr>
+</p:sld>
+</file>
+
 <file path=ppt/theme/theme1.xml><?xml version="1.0" encoding="utf-8"?>
 <a:theme xmlns:a="http://schemas.openxmlformats.org/drawingml/2006/main" name="Office Theme">
   <a:themeElements>

</xml_diff>

<commit_message>
Modifying Phevaluator diagram so font is legible.
</commit_message>
<xml_diff>
--- a/extras/FiguresClinicalValidity.pptx
+++ b/extras/FiguresClinicalValidity.pptx
@@ -7,6 +7,7 @@
   <p:sldIdLst>
     <p:sldId id="266" r:id="rId2"/>
     <p:sldId id="267" r:id="rId3"/>
+    <p:sldId id="268" r:id="rId4"/>
   </p:sldIdLst>
   <p:sldSz cx="12192000" cy="6858000"/>
   <p:notesSz cx="6858000" cy="9144000"/>
@@ -260,7 +261,7 @@
           <a:p>
             <a:fld id="{05EFC541-71C0-43FA-B841-C6A9FD087892}" type="datetimeFigureOut">
               <a:rPr lang="en-US" smtClean="0"/>
-              <a:t>8/25/2019</a:t>
+              <a:t>8/27/2019</a:t>
             </a:fld>
             <a:endParaRPr lang="en-US"/>
           </a:p>
@@ -458,7 +459,7 @@
           <a:p>
             <a:fld id="{05EFC541-71C0-43FA-B841-C6A9FD087892}" type="datetimeFigureOut">
               <a:rPr lang="en-US" smtClean="0"/>
-              <a:t>8/25/2019</a:t>
+              <a:t>8/27/2019</a:t>
             </a:fld>
             <a:endParaRPr lang="en-US"/>
           </a:p>
@@ -666,7 +667,7 @@
           <a:p>
             <a:fld id="{05EFC541-71C0-43FA-B841-C6A9FD087892}" type="datetimeFigureOut">
               <a:rPr lang="en-US" smtClean="0"/>
-              <a:t>8/25/2019</a:t>
+              <a:t>8/27/2019</a:t>
             </a:fld>
             <a:endParaRPr lang="en-US"/>
           </a:p>
@@ -864,7 +865,7 @@
           <a:p>
             <a:fld id="{05EFC541-71C0-43FA-B841-C6A9FD087892}" type="datetimeFigureOut">
               <a:rPr lang="en-US" smtClean="0"/>
-              <a:t>8/25/2019</a:t>
+              <a:t>8/27/2019</a:t>
             </a:fld>
             <a:endParaRPr lang="en-US"/>
           </a:p>
@@ -1139,7 +1140,7 @@
           <a:p>
             <a:fld id="{05EFC541-71C0-43FA-B841-C6A9FD087892}" type="datetimeFigureOut">
               <a:rPr lang="en-US" smtClean="0"/>
-              <a:t>8/25/2019</a:t>
+              <a:t>8/27/2019</a:t>
             </a:fld>
             <a:endParaRPr lang="en-US"/>
           </a:p>
@@ -1404,7 +1405,7 @@
           <a:p>
             <a:fld id="{05EFC541-71C0-43FA-B841-C6A9FD087892}" type="datetimeFigureOut">
               <a:rPr lang="en-US" smtClean="0"/>
-              <a:t>8/25/2019</a:t>
+              <a:t>8/27/2019</a:t>
             </a:fld>
             <a:endParaRPr lang="en-US"/>
           </a:p>
@@ -1816,7 +1817,7 @@
           <a:p>
             <a:fld id="{05EFC541-71C0-43FA-B841-C6A9FD087892}" type="datetimeFigureOut">
               <a:rPr lang="en-US" smtClean="0"/>
-              <a:t>8/25/2019</a:t>
+              <a:t>8/27/2019</a:t>
             </a:fld>
             <a:endParaRPr lang="en-US"/>
           </a:p>
@@ -1957,7 +1958,7 @@
           <a:p>
             <a:fld id="{05EFC541-71C0-43FA-B841-C6A9FD087892}" type="datetimeFigureOut">
               <a:rPr lang="en-US" smtClean="0"/>
-              <a:t>8/25/2019</a:t>
+              <a:t>8/27/2019</a:t>
             </a:fld>
             <a:endParaRPr lang="en-US"/>
           </a:p>
@@ -2070,7 +2071,7 @@
           <a:p>
             <a:fld id="{05EFC541-71C0-43FA-B841-C6A9FD087892}" type="datetimeFigureOut">
               <a:rPr lang="en-US" smtClean="0"/>
-              <a:t>8/25/2019</a:t>
+              <a:t>8/27/2019</a:t>
             </a:fld>
             <a:endParaRPr lang="en-US"/>
           </a:p>
@@ -2381,7 +2382,7 @@
           <a:p>
             <a:fld id="{05EFC541-71C0-43FA-B841-C6A9FD087892}" type="datetimeFigureOut">
               <a:rPr lang="en-US" smtClean="0"/>
-              <a:t>8/25/2019</a:t>
+              <a:t>8/27/2019</a:t>
             </a:fld>
             <a:endParaRPr lang="en-US"/>
           </a:p>
@@ -2669,7 +2670,7 @@
           <a:p>
             <a:fld id="{05EFC541-71C0-43FA-B841-C6A9FD087892}" type="datetimeFigureOut">
               <a:rPr lang="en-US" smtClean="0"/>
-              <a:t>8/25/2019</a:t>
+              <a:t>8/27/2019</a:t>
             </a:fld>
             <a:endParaRPr lang="en-US"/>
           </a:p>
@@ -2910,7 +2911,7 @@
           <a:p>
             <a:fld id="{05EFC541-71C0-43FA-B841-C6A9FD087892}" type="datetimeFigureOut">
               <a:rPr lang="en-US" smtClean="0"/>
-              <a:t>8/25/2019</a:t>
+              <a:t>8/27/2019</a:t>
             </a:fld>
             <a:endParaRPr lang="en-US"/>
           </a:p>
@@ -4944,6 +4945,785 @@
 </p:sld>
 </file>
 
+<file path=ppt/slides/slide3.xml><?xml version="1.0" encoding="utf-8"?>
+<p:sld xmlns:a="http://schemas.openxmlformats.org/drawingml/2006/main" xmlns:r="http://schemas.openxmlformats.org/officeDocument/2006/relationships" xmlns:p="http://schemas.openxmlformats.org/presentationml/2006/main">
+  <p:cSld>
+    <p:spTree>
+      <p:nvGrpSpPr>
+        <p:cNvPr id="1" name=""/>
+        <p:cNvGrpSpPr/>
+        <p:nvPr/>
+      </p:nvGrpSpPr>
+      <p:grpSpPr>
+        <a:xfrm>
+          <a:off x="0" y="0"/>
+          <a:ext cx="0" cy="0"/>
+          <a:chOff x="0" y="0"/>
+          <a:chExt cx="0" cy="0"/>
+        </a:xfrm>
+      </p:grpSpPr>
+      <p:sp>
+        <p:nvSpPr>
+          <p:cNvPr id="47" name="Rectangle: Rounded Corners 46">
+            <a:extLst>
+              <a:ext uri="{FF2B5EF4-FFF2-40B4-BE49-F238E27FC236}">
+                <a16:creationId xmlns:a16="http://schemas.microsoft.com/office/drawing/2014/main" id="{E60BBD32-927C-41EB-836A-8934B7F11222}"/>
+              </a:ext>
+            </a:extLst>
+          </p:cNvPr>
+          <p:cNvSpPr/>
+          <p:nvPr/>
+        </p:nvSpPr>
+        <p:spPr>
+          <a:xfrm>
+            <a:off x="638073" y="4836677"/>
+            <a:ext cx="4676877" cy="1145473"/>
+          </a:xfrm>
+          <a:prstGeom prst="roundRect">
+            <a:avLst>
+              <a:gd name="adj" fmla="val 7624"/>
+            </a:avLst>
+          </a:prstGeom>
+          <a:solidFill>
+            <a:schemeClr val="bg1">
+              <a:lumMod val="85000"/>
+            </a:schemeClr>
+          </a:solidFill>
+          <a:ln w="19050">
+            <a:solidFill>
+              <a:schemeClr val="tx1"/>
+            </a:solidFill>
+            <a:prstDash val="dash"/>
+          </a:ln>
+        </p:spPr>
+        <p:style>
+          <a:lnRef idx="2">
+            <a:schemeClr val="accent1">
+              <a:shade val="50000"/>
+            </a:schemeClr>
+          </a:lnRef>
+          <a:fillRef idx="1">
+            <a:schemeClr val="accent1"/>
+          </a:fillRef>
+          <a:effectRef idx="0">
+            <a:schemeClr val="accent1"/>
+          </a:effectRef>
+          <a:fontRef idx="minor">
+            <a:schemeClr val="lt1"/>
+          </a:fontRef>
+        </p:style>
+        <p:txBody>
+          <a:bodyPr rtlCol="0" anchor="ctr"/>
+          <a:lstStyle/>
+          <a:p>
+            <a:pPr algn="ctr"/>
+            <a:endParaRPr lang="en-US"/>
+          </a:p>
+        </p:txBody>
+      </p:sp>
+      <p:sp>
+        <p:nvSpPr>
+          <p:cNvPr id="43" name="Rectangle: Rounded Corners 42">
+            <a:extLst>
+              <a:ext uri="{FF2B5EF4-FFF2-40B4-BE49-F238E27FC236}">
+                <a16:creationId xmlns:a16="http://schemas.microsoft.com/office/drawing/2014/main" id="{C41273BA-A9DE-4EC7-86D2-6C4223460FAF}"/>
+              </a:ext>
+            </a:extLst>
+          </p:cNvPr>
+          <p:cNvSpPr/>
+          <p:nvPr/>
+        </p:nvSpPr>
+        <p:spPr>
+          <a:xfrm>
+            <a:off x="2162309" y="1032069"/>
+            <a:ext cx="3152641" cy="2949381"/>
+          </a:xfrm>
+          <a:prstGeom prst="roundRect">
+            <a:avLst>
+              <a:gd name="adj" fmla="val 7624"/>
+            </a:avLst>
+          </a:prstGeom>
+          <a:solidFill>
+            <a:schemeClr val="bg1">
+              <a:lumMod val="85000"/>
+            </a:schemeClr>
+          </a:solidFill>
+          <a:ln w="19050">
+            <a:solidFill>
+              <a:schemeClr val="tx1"/>
+            </a:solidFill>
+            <a:prstDash val="dash"/>
+          </a:ln>
+        </p:spPr>
+        <p:style>
+          <a:lnRef idx="2">
+            <a:schemeClr val="accent1">
+              <a:shade val="50000"/>
+            </a:schemeClr>
+          </a:lnRef>
+          <a:fillRef idx="1">
+            <a:schemeClr val="accent1"/>
+          </a:fillRef>
+          <a:effectRef idx="0">
+            <a:schemeClr val="accent1"/>
+          </a:effectRef>
+          <a:fontRef idx="minor">
+            <a:schemeClr val="lt1"/>
+          </a:fontRef>
+        </p:style>
+        <p:txBody>
+          <a:bodyPr rtlCol="0" anchor="ctr"/>
+          <a:lstStyle/>
+          <a:p>
+            <a:pPr algn="ctr"/>
+            <a:endParaRPr lang="en-US"/>
+          </a:p>
+        </p:txBody>
+      </p:sp>
+      <p:sp>
+        <p:nvSpPr>
+          <p:cNvPr id="42" name="Rectangle: Rounded Corners 41">
+            <a:extLst>
+              <a:ext uri="{FF2B5EF4-FFF2-40B4-BE49-F238E27FC236}">
+                <a16:creationId xmlns:a16="http://schemas.microsoft.com/office/drawing/2014/main" id="{D1668C60-7D7B-4873-ACDA-8D1C8FA6971F}"/>
+              </a:ext>
+            </a:extLst>
+          </p:cNvPr>
+          <p:cNvSpPr/>
+          <p:nvPr/>
+        </p:nvSpPr>
+        <p:spPr>
+          <a:xfrm>
+            <a:off x="638073" y="709613"/>
+            <a:ext cx="1249305" cy="4051330"/>
+          </a:xfrm>
+          <a:prstGeom prst="roundRect">
+            <a:avLst/>
+          </a:prstGeom>
+          <a:solidFill>
+            <a:schemeClr val="bg1">
+              <a:lumMod val="85000"/>
+            </a:schemeClr>
+          </a:solidFill>
+          <a:ln w="19050">
+            <a:solidFill>
+              <a:schemeClr val="tx1"/>
+            </a:solidFill>
+            <a:prstDash val="dash"/>
+          </a:ln>
+        </p:spPr>
+        <p:style>
+          <a:lnRef idx="2">
+            <a:schemeClr val="accent1">
+              <a:shade val="50000"/>
+            </a:schemeClr>
+          </a:lnRef>
+          <a:fillRef idx="1">
+            <a:schemeClr val="accent1"/>
+          </a:fillRef>
+          <a:effectRef idx="0">
+            <a:schemeClr val="accent1"/>
+          </a:effectRef>
+          <a:fontRef idx="minor">
+            <a:schemeClr val="lt1"/>
+          </a:fontRef>
+        </p:style>
+        <p:txBody>
+          <a:bodyPr rtlCol="0" anchor="ctr"/>
+          <a:lstStyle/>
+          <a:p>
+            <a:pPr algn="ctr"/>
+            <a:endParaRPr lang="en-US"/>
+          </a:p>
+        </p:txBody>
+      </p:sp>
+      <p:pic>
+        <p:nvPicPr>
+          <p:cNvPr id="11" name="Picture 10">
+            <a:extLst>
+              <a:ext uri="{FF2B5EF4-FFF2-40B4-BE49-F238E27FC236}">
+                <a16:creationId xmlns:a16="http://schemas.microsoft.com/office/drawing/2014/main" id="{61E98F32-4D14-493E-92F9-F4B976DF64FC}"/>
+              </a:ext>
+            </a:extLst>
+          </p:cNvPr>
+          <p:cNvPicPr>
+            <a:picLocks noChangeAspect="1"/>
+          </p:cNvPicPr>
+          <p:nvPr/>
+        </p:nvPicPr>
+        <p:blipFill rotWithShape="1">
+          <a:blip r:embed="rId2"/>
+          <a:srcRect t="14169"/>
+          <a:stretch/>
+        </p:blipFill>
+        <p:spPr>
+          <a:xfrm>
+            <a:off x="2200289" y="1339325"/>
+            <a:ext cx="3054353" cy="2351517"/>
+          </a:xfrm>
+          <a:prstGeom prst="rect">
+            <a:avLst/>
+          </a:prstGeom>
+          <a:solidFill>
+            <a:schemeClr val="accent1">
+              <a:lumMod val="40000"/>
+              <a:lumOff val="60000"/>
+            </a:schemeClr>
+          </a:solidFill>
+        </p:spPr>
+      </p:pic>
+      <p:pic>
+        <p:nvPicPr>
+          <p:cNvPr id="13" name="Picture 12">
+            <a:extLst>
+              <a:ext uri="{FF2B5EF4-FFF2-40B4-BE49-F238E27FC236}">
+                <a16:creationId xmlns:a16="http://schemas.microsoft.com/office/drawing/2014/main" id="{C1ED3FCD-DF09-47A0-A74E-033589ABCC5C}"/>
+              </a:ext>
+            </a:extLst>
+          </p:cNvPr>
+          <p:cNvPicPr>
+            <a:picLocks noChangeAspect="1"/>
+          </p:cNvPicPr>
+          <p:nvPr/>
+        </p:nvPicPr>
+        <p:blipFill rotWithShape="1">
+          <a:blip r:embed="rId3"/>
+          <a:srcRect t="15823"/>
+          <a:stretch/>
+        </p:blipFill>
+        <p:spPr>
+          <a:xfrm>
+            <a:off x="828186" y="2553637"/>
+            <a:ext cx="933146" cy="1830670"/>
+          </a:xfrm>
+          <a:prstGeom prst="rect">
+            <a:avLst/>
+          </a:prstGeom>
+        </p:spPr>
+      </p:pic>
+      <p:sp>
+        <p:nvSpPr>
+          <p:cNvPr id="14" name="TextBox 13">
+            <a:extLst>
+              <a:ext uri="{FF2B5EF4-FFF2-40B4-BE49-F238E27FC236}">
+                <a16:creationId xmlns:a16="http://schemas.microsoft.com/office/drawing/2014/main" id="{F6728B8A-CFB3-4F62-B175-692C4D6728E3}"/>
+              </a:ext>
+            </a:extLst>
+          </p:cNvPr>
+          <p:cNvSpPr txBox="1"/>
+          <p:nvPr/>
+        </p:nvSpPr>
+        <p:spPr>
+          <a:xfrm>
+            <a:off x="1100661" y="662737"/>
+            <a:ext cx="324128" cy="369332"/>
+          </a:xfrm>
+          <a:prstGeom prst="rect">
+            <a:avLst/>
+          </a:prstGeom>
+          <a:noFill/>
+        </p:spPr>
+        <p:txBody>
+          <a:bodyPr wrap="none" rtlCol="0">
+            <a:spAutoFit/>
+          </a:bodyPr>
+          <a:lstStyle/>
+          <a:p>
+            <a:r>
+              <a:rPr lang="en-US" b="1" dirty="0"/>
+              <a:t>A</a:t>
+            </a:r>
+          </a:p>
+        </p:txBody>
+      </p:sp>
+      <p:sp>
+        <p:nvSpPr>
+          <p:cNvPr id="16" name="TextBox 15">
+            <a:extLst>
+              <a:ext uri="{FF2B5EF4-FFF2-40B4-BE49-F238E27FC236}">
+                <a16:creationId xmlns:a16="http://schemas.microsoft.com/office/drawing/2014/main" id="{DA50FE81-6073-4180-879D-368B6BE150D5}"/>
+              </a:ext>
+            </a:extLst>
+          </p:cNvPr>
+          <p:cNvSpPr txBox="1"/>
+          <p:nvPr/>
+        </p:nvSpPr>
+        <p:spPr>
+          <a:xfrm>
+            <a:off x="3581374" y="1001031"/>
+            <a:ext cx="314510" cy="369332"/>
+          </a:xfrm>
+          <a:prstGeom prst="rect">
+            <a:avLst/>
+          </a:prstGeom>
+          <a:noFill/>
+        </p:spPr>
+        <p:txBody>
+          <a:bodyPr wrap="none" rtlCol="0">
+            <a:spAutoFit/>
+          </a:bodyPr>
+          <a:lstStyle/>
+          <a:p>
+            <a:r>
+              <a:rPr lang="en-US" b="1" dirty="0"/>
+              <a:t>B</a:t>
+            </a:r>
+          </a:p>
+        </p:txBody>
+      </p:sp>
+      <p:pic>
+        <p:nvPicPr>
+          <p:cNvPr id="21" name="Picture 20">
+            <a:extLst>
+              <a:ext uri="{FF2B5EF4-FFF2-40B4-BE49-F238E27FC236}">
+                <a16:creationId xmlns:a16="http://schemas.microsoft.com/office/drawing/2014/main" id="{3B4F126A-7041-4F44-B823-D8378FFFFD52}"/>
+              </a:ext>
+            </a:extLst>
+          </p:cNvPr>
+          <p:cNvPicPr>
+            <a:picLocks noChangeAspect="1"/>
+          </p:cNvPicPr>
+          <p:nvPr/>
+        </p:nvPicPr>
+        <p:blipFill rotWithShape="1">
+          <a:blip r:embed="rId4"/>
+          <a:srcRect t="24957"/>
+          <a:stretch/>
+        </p:blipFill>
+        <p:spPr>
+          <a:xfrm>
+            <a:off x="890359" y="985192"/>
+            <a:ext cx="870972" cy="919232"/>
+          </a:xfrm>
+          <a:prstGeom prst="rect">
+            <a:avLst/>
+          </a:prstGeom>
+        </p:spPr>
+      </p:pic>
+      <p:sp>
+        <p:nvSpPr>
+          <p:cNvPr id="22" name="Rectangle 21">
+            <a:extLst>
+              <a:ext uri="{FF2B5EF4-FFF2-40B4-BE49-F238E27FC236}">
+                <a16:creationId xmlns:a16="http://schemas.microsoft.com/office/drawing/2014/main" id="{B2199C46-0D86-485B-B8AE-3CC7563F0484}"/>
+              </a:ext>
+            </a:extLst>
+          </p:cNvPr>
+          <p:cNvSpPr/>
+          <p:nvPr/>
+        </p:nvSpPr>
+        <p:spPr>
+          <a:xfrm>
+            <a:off x="638073" y="1855449"/>
+            <a:ext cx="1309930" cy="600164"/>
+          </a:xfrm>
+          <a:prstGeom prst="rect">
+            <a:avLst/>
+          </a:prstGeom>
+        </p:spPr>
+        <p:txBody>
+          <a:bodyPr wrap="square">
+            <a:spAutoFit/>
+          </a:bodyPr>
+          <a:lstStyle/>
+          <a:p>
+            <a:pPr algn="ctr"/>
+            <a:r>
+              <a:rPr lang="en-US" sz="1100" dirty="0"/>
+              <a:t>Cohort according to definition to evaluate</a:t>
+            </a:r>
+          </a:p>
+        </p:txBody>
+      </p:sp>
+      <p:sp>
+        <p:nvSpPr>
+          <p:cNvPr id="24" name="Rectangle 23">
+            <a:extLst>
+              <a:ext uri="{FF2B5EF4-FFF2-40B4-BE49-F238E27FC236}">
+                <a16:creationId xmlns:a16="http://schemas.microsoft.com/office/drawing/2014/main" id="{A41981B0-6864-4CEA-A9B9-F935EDB6A652}"/>
+              </a:ext>
+            </a:extLst>
+          </p:cNvPr>
+          <p:cNvSpPr/>
+          <p:nvPr/>
+        </p:nvSpPr>
+        <p:spPr>
+          <a:xfrm>
+            <a:off x="638073" y="4330056"/>
+            <a:ext cx="1309930" cy="430887"/>
+          </a:xfrm>
+          <a:prstGeom prst="rect">
+            <a:avLst/>
+          </a:prstGeom>
+        </p:spPr>
+        <p:txBody>
+          <a:bodyPr wrap="square">
+            <a:spAutoFit/>
+          </a:bodyPr>
+          <a:lstStyle/>
+          <a:p>
+            <a:pPr algn="ctr"/>
+            <a:r>
+              <a:rPr lang="en-US" sz="1100" dirty="0"/>
+              <a:t>Predicted probabilities</a:t>
+            </a:r>
+          </a:p>
+        </p:txBody>
+      </p:sp>
+      <p:sp>
+        <p:nvSpPr>
+          <p:cNvPr id="25" name="Rectangle 24">
+            <a:extLst>
+              <a:ext uri="{FF2B5EF4-FFF2-40B4-BE49-F238E27FC236}">
+                <a16:creationId xmlns:a16="http://schemas.microsoft.com/office/drawing/2014/main" id="{49DA0629-B21A-49FB-807A-4C68B8C80CAF}"/>
+              </a:ext>
+            </a:extLst>
+          </p:cNvPr>
+          <p:cNvSpPr/>
+          <p:nvPr/>
+        </p:nvSpPr>
+        <p:spPr>
+          <a:xfrm>
+            <a:off x="2200289" y="3661672"/>
+            <a:ext cx="2949578" cy="261610"/>
+          </a:xfrm>
+          <a:prstGeom prst="rect">
+            <a:avLst/>
+          </a:prstGeom>
+        </p:spPr>
+        <p:txBody>
+          <a:bodyPr wrap="square">
+            <a:spAutoFit/>
+          </a:bodyPr>
+          <a:lstStyle/>
+          <a:p>
+            <a:pPr algn="ctr"/>
+            <a:r>
+              <a:rPr lang="en-US" sz="1100" dirty="0"/>
+              <a:t>Computation of (weighted) confusion matrix</a:t>
+            </a:r>
+          </a:p>
+        </p:txBody>
+      </p:sp>
+      <p:cxnSp>
+        <p:nvCxnSpPr>
+          <p:cNvPr id="26" name="Connector: Elbow 25">
+            <a:extLst>
+              <a:ext uri="{FF2B5EF4-FFF2-40B4-BE49-F238E27FC236}">
+                <a16:creationId xmlns:a16="http://schemas.microsoft.com/office/drawing/2014/main" id="{41A1105A-8B91-427E-A5BE-EED1951CF491}"/>
+              </a:ext>
+            </a:extLst>
+          </p:cNvPr>
+          <p:cNvCxnSpPr>
+            <a:cxnSpLocks/>
+            <a:stCxn id="21" idx="3"/>
+            <a:endCxn id="43" idx="1"/>
+          </p:cNvCxnSpPr>
+          <p:nvPr/>
+        </p:nvCxnSpPr>
+        <p:spPr>
+          <a:xfrm>
+            <a:off x="1761331" y="1444808"/>
+            <a:ext cx="400978" cy="1061952"/>
+          </a:xfrm>
+          <a:prstGeom prst="bentConnector3">
+            <a:avLst>
+              <a:gd name="adj1" fmla="val 50000"/>
+            </a:avLst>
+          </a:prstGeom>
+          <a:ln w="38100">
+            <a:solidFill>
+              <a:schemeClr val="tx1"/>
+            </a:solidFill>
+            <a:tailEnd type="triangle"/>
+          </a:ln>
+        </p:spPr>
+        <p:style>
+          <a:lnRef idx="1">
+            <a:schemeClr val="dk1"/>
+          </a:lnRef>
+          <a:fillRef idx="0">
+            <a:schemeClr val="dk1"/>
+          </a:fillRef>
+          <a:effectRef idx="0">
+            <a:schemeClr val="dk1"/>
+          </a:effectRef>
+          <a:fontRef idx="minor">
+            <a:schemeClr val="tx1"/>
+          </a:fontRef>
+        </p:style>
+      </p:cxnSp>
+      <p:cxnSp>
+        <p:nvCxnSpPr>
+          <p:cNvPr id="29" name="Connector: Elbow 28">
+            <a:extLst>
+              <a:ext uri="{FF2B5EF4-FFF2-40B4-BE49-F238E27FC236}">
+                <a16:creationId xmlns:a16="http://schemas.microsoft.com/office/drawing/2014/main" id="{AF3BCE47-0C13-436A-987E-653233697081}"/>
+              </a:ext>
+            </a:extLst>
+          </p:cNvPr>
+          <p:cNvCxnSpPr>
+            <a:cxnSpLocks/>
+            <a:stCxn id="13" idx="3"/>
+            <a:endCxn id="43" idx="1"/>
+          </p:cNvCxnSpPr>
+          <p:nvPr/>
+        </p:nvCxnSpPr>
+        <p:spPr>
+          <a:xfrm flipV="1">
+            <a:off x="1761332" y="2506760"/>
+            <a:ext cx="400977" cy="962212"/>
+          </a:xfrm>
+          <a:prstGeom prst="bentConnector3">
+            <a:avLst>
+              <a:gd name="adj1" fmla="val 50000"/>
+            </a:avLst>
+          </a:prstGeom>
+          <a:ln w="38100">
+            <a:solidFill>
+              <a:schemeClr val="tx1"/>
+            </a:solidFill>
+            <a:tailEnd type="triangle"/>
+          </a:ln>
+        </p:spPr>
+        <p:style>
+          <a:lnRef idx="1">
+            <a:schemeClr val="dk1"/>
+          </a:lnRef>
+          <a:fillRef idx="0">
+            <a:schemeClr val="dk1"/>
+          </a:fillRef>
+          <a:effectRef idx="0">
+            <a:schemeClr val="dk1"/>
+          </a:effectRef>
+          <a:fontRef idx="minor">
+            <a:schemeClr val="tx1"/>
+          </a:fontRef>
+        </p:style>
+      </p:cxnSp>
+      <p:sp>
+        <p:nvSpPr>
+          <p:cNvPr id="32" name="Rectangle 31">
+            <a:extLst>
+              <a:ext uri="{FF2B5EF4-FFF2-40B4-BE49-F238E27FC236}">
+                <a16:creationId xmlns:a16="http://schemas.microsoft.com/office/drawing/2014/main" id="{AF73A00E-F084-4754-BD78-C48482419780}"/>
+              </a:ext>
+            </a:extLst>
+          </p:cNvPr>
+          <p:cNvSpPr/>
+          <p:nvPr/>
+        </p:nvSpPr>
+        <p:spPr>
+          <a:xfrm>
+            <a:off x="714375" y="4926163"/>
+            <a:ext cx="4540267" cy="728974"/>
+          </a:xfrm>
+          <a:prstGeom prst="rect">
+            <a:avLst/>
+          </a:prstGeom>
+          <a:solidFill>
+            <a:schemeClr val="bg1"/>
+          </a:solidFill>
+          <a:ln>
+            <a:solidFill>
+              <a:schemeClr val="tx1">
+                <a:lumMod val="50000"/>
+                <a:lumOff val="50000"/>
+              </a:schemeClr>
+            </a:solidFill>
+          </a:ln>
+        </p:spPr>
+        <p:style>
+          <a:lnRef idx="2">
+            <a:schemeClr val="accent1">
+              <a:shade val="50000"/>
+            </a:schemeClr>
+          </a:lnRef>
+          <a:fillRef idx="1">
+            <a:schemeClr val="accent1"/>
+          </a:fillRef>
+          <a:effectRef idx="0">
+            <a:schemeClr val="accent1"/>
+          </a:effectRef>
+          <a:fontRef idx="minor">
+            <a:schemeClr val="lt1"/>
+          </a:fontRef>
+        </p:style>
+        <p:txBody>
+          <a:bodyPr rtlCol="0" anchor="ctr"/>
+          <a:lstStyle/>
+          <a:p>
+            <a:r>
+              <a:rPr lang="en-US" sz="1100" dirty="0">
+                <a:solidFill>
+                  <a:schemeClr val="tx1"/>
+                </a:solidFill>
+              </a:rPr>
+              <a:t>Sensitivity = 		TP/(TP + FN) = 	2.08/(2.08 + 0.03) =   0.99</a:t>
+            </a:r>
+          </a:p>
+          <a:p>
+            <a:r>
+              <a:rPr lang="en-US" sz="1100" dirty="0">
+                <a:solidFill>
+                  <a:schemeClr val="tx1"/>
+                </a:solidFill>
+              </a:rPr>
+              <a:t>Specificity = 		TN/(TN + FP) = 	4.97/(4.97 + 2.92) =   0.63</a:t>
+            </a:r>
+          </a:p>
+          <a:p>
+            <a:r>
+              <a:rPr lang="en-US" sz="1100" dirty="0">
+                <a:solidFill>
+                  <a:schemeClr val="tx1"/>
+                </a:solidFill>
+              </a:rPr>
+              <a:t>Positive Predictive Value = 	TP/(TP + FP) = 	2.08/(2.08 + 2.92) =   0.42</a:t>
+            </a:r>
+          </a:p>
+          <a:p>
+            <a:r>
+              <a:rPr lang="en-US" sz="1100" dirty="0">
+                <a:solidFill>
+                  <a:schemeClr val="tx1"/>
+                </a:solidFill>
+              </a:rPr>
+              <a:t>Negative Predictive Value = 	TN/(TN + FN) = 	4.97/(4.97 + 0.03) =   0.99</a:t>
+            </a:r>
+          </a:p>
+        </p:txBody>
+      </p:sp>
+      <p:cxnSp>
+        <p:nvCxnSpPr>
+          <p:cNvPr id="33" name="Connector: Elbow 32">
+            <a:extLst>
+              <a:ext uri="{FF2B5EF4-FFF2-40B4-BE49-F238E27FC236}">
+                <a16:creationId xmlns:a16="http://schemas.microsoft.com/office/drawing/2014/main" id="{D3C36C4A-4D5F-4C68-BC9D-94FAB2C2A311}"/>
+              </a:ext>
+            </a:extLst>
+          </p:cNvPr>
+          <p:cNvCxnSpPr>
+            <a:cxnSpLocks/>
+            <a:endCxn id="47" idx="0"/>
+          </p:cNvCxnSpPr>
+          <p:nvPr/>
+        </p:nvCxnSpPr>
+        <p:spPr>
+          <a:xfrm rot="5400000">
+            <a:off x="2859661" y="4114951"/>
+            <a:ext cx="838577" cy="604874"/>
+          </a:xfrm>
+          <a:prstGeom prst="bentConnector3">
+            <a:avLst>
+              <a:gd name="adj1" fmla="val 50000"/>
+            </a:avLst>
+          </a:prstGeom>
+          <a:ln w="38100">
+            <a:solidFill>
+              <a:schemeClr val="tx1"/>
+            </a:solidFill>
+            <a:tailEnd type="triangle"/>
+          </a:ln>
+        </p:spPr>
+        <p:style>
+          <a:lnRef idx="1">
+            <a:schemeClr val="dk1"/>
+          </a:lnRef>
+          <a:fillRef idx="0">
+            <a:schemeClr val="dk1"/>
+          </a:fillRef>
+          <a:effectRef idx="0">
+            <a:schemeClr val="dk1"/>
+          </a:effectRef>
+          <a:fontRef idx="minor">
+            <a:schemeClr val="tx1"/>
+          </a:fontRef>
+        </p:style>
+      </p:cxnSp>
+      <p:sp>
+        <p:nvSpPr>
+          <p:cNvPr id="51" name="Rectangle 50">
+            <a:extLst>
+              <a:ext uri="{FF2B5EF4-FFF2-40B4-BE49-F238E27FC236}">
+                <a16:creationId xmlns:a16="http://schemas.microsoft.com/office/drawing/2014/main" id="{9AAF0094-719C-4B45-8106-D2EABE5C2DF2}"/>
+              </a:ext>
+            </a:extLst>
+          </p:cNvPr>
+          <p:cNvSpPr/>
+          <p:nvPr/>
+        </p:nvSpPr>
+        <p:spPr>
+          <a:xfrm>
+            <a:off x="1501722" y="5611198"/>
+            <a:ext cx="2949578" cy="261610"/>
+          </a:xfrm>
+          <a:prstGeom prst="rect">
+            <a:avLst/>
+          </a:prstGeom>
+        </p:spPr>
+        <p:txBody>
+          <a:bodyPr wrap="square">
+            <a:spAutoFit/>
+          </a:bodyPr>
+          <a:lstStyle/>
+          <a:p>
+            <a:pPr algn="ctr"/>
+            <a:r>
+              <a:rPr lang="en-US" sz="1100" dirty="0"/>
+              <a:t>Computation of cohort evaluation metrics</a:t>
+            </a:r>
+          </a:p>
+        </p:txBody>
+      </p:sp>
+      <p:sp>
+        <p:nvSpPr>
+          <p:cNvPr id="53" name="TextBox 52">
+            <a:extLst>
+              <a:ext uri="{FF2B5EF4-FFF2-40B4-BE49-F238E27FC236}">
+                <a16:creationId xmlns:a16="http://schemas.microsoft.com/office/drawing/2014/main" id="{40D32F06-C2A5-4BF8-922F-EFD8211FA6E0}"/>
+              </a:ext>
+            </a:extLst>
+          </p:cNvPr>
+          <p:cNvSpPr txBox="1"/>
+          <p:nvPr/>
+        </p:nvSpPr>
+        <p:spPr>
+          <a:xfrm>
+            <a:off x="628706" y="5618838"/>
+            <a:ext cx="314510" cy="369332"/>
+          </a:xfrm>
+          <a:prstGeom prst="rect">
+            <a:avLst/>
+          </a:prstGeom>
+          <a:noFill/>
+        </p:spPr>
+        <p:txBody>
+          <a:bodyPr wrap="none" rtlCol="0">
+            <a:spAutoFit/>
+          </a:bodyPr>
+          <a:lstStyle/>
+          <a:p>
+            <a:r>
+              <a:rPr lang="en-US" b="1" dirty="0"/>
+              <a:t>C</a:t>
+            </a:r>
+          </a:p>
+        </p:txBody>
+      </p:sp>
+    </p:spTree>
+    <p:extLst>
+      <p:ext uri="{BB962C8B-B14F-4D97-AF65-F5344CB8AC3E}">
+        <p14:creationId xmlns:p14="http://schemas.microsoft.com/office/powerpoint/2010/main" val="4019360442"/>
+      </p:ext>
+    </p:extLst>
+  </p:cSld>
+  <p:clrMapOvr>
+    <a:masterClrMapping/>
+  </p:clrMapOvr>
+</p:sld>
+</file>
+
 <file path=ppt/theme/theme1.xml><?xml version="1.0" encoding="utf-8"?>
 <a:theme xmlns:a="http://schemas.openxmlformats.org/drawingml/2006/main" name="Office Theme">
   <a:themeElements>

</xml_diff>

<commit_message>
Fixing confusion matrix in clinical validity chapter. Fixes #121
</commit_message>
<xml_diff>
--- a/extras/FiguresClinicalValidity.pptx
+++ b/extras/FiguresClinicalValidity.pptx
@@ -261,7 +261,7 @@
           <a:p>
             <a:fld id="{05EFC541-71C0-43FA-B841-C6A9FD087892}" type="datetimeFigureOut">
               <a:rPr lang="en-US" smtClean="0"/>
-              <a:t>8/27/2019</a:t>
+              <a:t>4/16/2020</a:t>
             </a:fld>
             <a:endParaRPr lang="en-US"/>
           </a:p>
@@ -459,7 +459,7 @@
           <a:p>
             <a:fld id="{05EFC541-71C0-43FA-B841-C6A9FD087892}" type="datetimeFigureOut">
               <a:rPr lang="en-US" smtClean="0"/>
-              <a:t>8/27/2019</a:t>
+              <a:t>4/16/2020</a:t>
             </a:fld>
             <a:endParaRPr lang="en-US"/>
           </a:p>
@@ -667,7 +667,7 @@
           <a:p>
             <a:fld id="{05EFC541-71C0-43FA-B841-C6A9FD087892}" type="datetimeFigureOut">
               <a:rPr lang="en-US" smtClean="0"/>
-              <a:t>8/27/2019</a:t>
+              <a:t>4/16/2020</a:t>
             </a:fld>
             <a:endParaRPr lang="en-US"/>
           </a:p>
@@ -865,7 +865,7 @@
           <a:p>
             <a:fld id="{05EFC541-71C0-43FA-B841-C6A9FD087892}" type="datetimeFigureOut">
               <a:rPr lang="en-US" smtClean="0"/>
-              <a:t>8/27/2019</a:t>
+              <a:t>4/16/2020</a:t>
             </a:fld>
             <a:endParaRPr lang="en-US"/>
           </a:p>
@@ -1140,7 +1140,7 @@
           <a:p>
             <a:fld id="{05EFC541-71C0-43FA-B841-C6A9FD087892}" type="datetimeFigureOut">
               <a:rPr lang="en-US" smtClean="0"/>
-              <a:t>8/27/2019</a:t>
+              <a:t>4/16/2020</a:t>
             </a:fld>
             <a:endParaRPr lang="en-US"/>
           </a:p>
@@ -1405,7 +1405,7 @@
           <a:p>
             <a:fld id="{05EFC541-71C0-43FA-B841-C6A9FD087892}" type="datetimeFigureOut">
               <a:rPr lang="en-US" smtClean="0"/>
-              <a:t>8/27/2019</a:t>
+              <a:t>4/16/2020</a:t>
             </a:fld>
             <a:endParaRPr lang="en-US"/>
           </a:p>
@@ -1817,7 +1817,7 @@
           <a:p>
             <a:fld id="{05EFC541-71C0-43FA-B841-C6A9FD087892}" type="datetimeFigureOut">
               <a:rPr lang="en-US" smtClean="0"/>
-              <a:t>8/27/2019</a:t>
+              <a:t>4/16/2020</a:t>
             </a:fld>
             <a:endParaRPr lang="en-US"/>
           </a:p>
@@ -1958,7 +1958,7 @@
           <a:p>
             <a:fld id="{05EFC541-71C0-43FA-B841-C6A9FD087892}" type="datetimeFigureOut">
               <a:rPr lang="en-US" smtClean="0"/>
-              <a:t>8/27/2019</a:t>
+              <a:t>4/16/2020</a:t>
             </a:fld>
             <a:endParaRPr lang="en-US"/>
           </a:p>
@@ -2071,7 +2071,7 @@
           <a:p>
             <a:fld id="{05EFC541-71C0-43FA-B841-C6A9FD087892}" type="datetimeFigureOut">
               <a:rPr lang="en-US" smtClean="0"/>
-              <a:t>8/27/2019</a:t>
+              <a:t>4/16/2020</a:t>
             </a:fld>
             <a:endParaRPr lang="en-US"/>
           </a:p>
@@ -2382,7 +2382,7 @@
           <a:p>
             <a:fld id="{05EFC541-71C0-43FA-B841-C6A9FD087892}" type="datetimeFigureOut">
               <a:rPr lang="en-US" smtClean="0"/>
-              <a:t>8/27/2019</a:t>
+              <a:t>4/16/2020</a:t>
             </a:fld>
             <a:endParaRPr lang="en-US"/>
           </a:p>
@@ -2670,7 +2670,7 @@
           <a:p>
             <a:fld id="{05EFC541-71C0-43FA-B841-C6A9FD087892}" type="datetimeFigureOut">
               <a:rPr lang="en-US" smtClean="0"/>
-              <a:t>8/27/2019</a:t>
+              <a:t>4/16/2020</a:t>
             </a:fld>
             <a:endParaRPr lang="en-US"/>
           </a:p>
@@ -2911,7 +2911,7 @@
           <a:p>
             <a:fld id="{05EFC541-71C0-43FA-B841-C6A9FD087892}" type="datetimeFigureOut">
               <a:rPr lang="en-US" smtClean="0"/>
-              <a:t>8/27/2019</a:t>
+              <a:t>4/16/2020</a:t>
             </a:fld>
             <a:endParaRPr lang="en-US"/>
           </a:p>
@@ -4468,7 +4468,7 @@
           <p:nvPr>
             <p:extLst>
               <p:ext uri="{D42A27DB-BD31-4B8C-83A1-F6EECF244321}">
-                <p14:modId xmlns:p14="http://schemas.microsoft.com/office/powerpoint/2010/main" val="3244282966"/>
+                <p14:modId xmlns:p14="http://schemas.microsoft.com/office/powerpoint/2010/main" val="1393286616"/>
               </p:ext>
             </p:extLst>
           </p:nvPr>
@@ -4736,7 +4736,7 @@
                       <a:pPr algn="ctr"/>
                       <a:r>
                         <a:rPr lang="en-US" dirty="0"/>
-                        <a:t>False Negative</a:t>
+                        <a:t>False Positive</a:t>
                       </a:r>
                     </a:p>
                   </a:txBody>

</xml_diff>